<commit_message>
(2020-06-03) 문서 및 index 파일 수정.
</commit_message>
<xml_diff>
--- a/Documents/사이트맵.pptx
+++ b/Documents/사이트맵.pptx
@@ -261,7 +261,7 @@
           <a:p>
             <a:fld id="{5E9156A5-F3EC-48FB-8574-275309479A4C}" type="datetimeFigureOut">
               <a:rPr lang="ko-KR" altLang="en-US" smtClean="0"/>
-              <a:t>2020-06-02</a:t>
+              <a:t>2020-06-03</a:t>
             </a:fld>
             <a:endParaRPr lang="ko-KR" altLang="en-US"/>
           </a:p>
@@ -459,7 +459,7 @@
           <a:p>
             <a:fld id="{5E9156A5-F3EC-48FB-8574-275309479A4C}" type="datetimeFigureOut">
               <a:rPr lang="ko-KR" altLang="en-US" smtClean="0"/>
-              <a:t>2020-06-02</a:t>
+              <a:t>2020-06-03</a:t>
             </a:fld>
             <a:endParaRPr lang="ko-KR" altLang="en-US"/>
           </a:p>
@@ -667,7 +667,7 @@
           <a:p>
             <a:fld id="{5E9156A5-F3EC-48FB-8574-275309479A4C}" type="datetimeFigureOut">
               <a:rPr lang="ko-KR" altLang="en-US" smtClean="0"/>
-              <a:t>2020-06-02</a:t>
+              <a:t>2020-06-03</a:t>
             </a:fld>
             <a:endParaRPr lang="ko-KR" altLang="en-US"/>
           </a:p>
@@ -865,7 +865,7 @@
           <a:p>
             <a:fld id="{5E9156A5-F3EC-48FB-8574-275309479A4C}" type="datetimeFigureOut">
               <a:rPr lang="ko-KR" altLang="en-US" smtClean="0"/>
-              <a:t>2020-06-02</a:t>
+              <a:t>2020-06-03</a:t>
             </a:fld>
             <a:endParaRPr lang="ko-KR" altLang="en-US"/>
           </a:p>
@@ -1140,7 +1140,7 @@
           <a:p>
             <a:fld id="{5E9156A5-F3EC-48FB-8574-275309479A4C}" type="datetimeFigureOut">
               <a:rPr lang="ko-KR" altLang="en-US" smtClean="0"/>
-              <a:t>2020-06-02</a:t>
+              <a:t>2020-06-03</a:t>
             </a:fld>
             <a:endParaRPr lang="ko-KR" altLang="en-US"/>
           </a:p>
@@ -1405,7 +1405,7 @@
           <a:p>
             <a:fld id="{5E9156A5-F3EC-48FB-8574-275309479A4C}" type="datetimeFigureOut">
               <a:rPr lang="ko-KR" altLang="en-US" smtClean="0"/>
-              <a:t>2020-06-02</a:t>
+              <a:t>2020-06-03</a:t>
             </a:fld>
             <a:endParaRPr lang="ko-KR" altLang="en-US"/>
           </a:p>
@@ -1817,7 +1817,7 @@
           <a:p>
             <a:fld id="{5E9156A5-F3EC-48FB-8574-275309479A4C}" type="datetimeFigureOut">
               <a:rPr lang="ko-KR" altLang="en-US" smtClean="0"/>
-              <a:t>2020-06-02</a:t>
+              <a:t>2020-06-03</a:t>
             </a:fld>
             <a:endParaRPr lang="ko-KR" altLang="en-US"/>
           </a:p>
@@ -1958,7 +1958,7 @@
           <a:p>
             <a:fld id="{5E9156A5-F3EC-48FB-8574-275309479A4C}" type="datetimeFigureOut">
               <a:rPr lang="ko-KR" altLang="en-US" smtClean="0"/>
-              <a:t>2020-06-02</a:t>
+              <a:t>2020-06-03</a:t>
             </a:fld>
             <a:endParaRPr lang="ko-KR" altLang="en-US"/>
           </a:p>
@@ -2071,7 +2071,7 @@
           <a:p>
             <a:fld id="{5E9156A5-F3EC-48FB-8574-275309479A4C}" type="datetimeFigureOut">
               <a:rPr lang="ko-KR" altLang="en-US" smtClean="0"/>
-              <a:t>2020-06-02</a:t>
+              <a:t>2020-06-03</a:t>
             </a:fld>
             <a:endParaRPr lang="ko-KR" altLang="en-US"/>
           </a:p>
@@ -2382,7 +2382,7 @@
           <a:p>
             <a:fld id="{5E9156A5-F3EC-48FB-8574-275309479A4C}" type="datetimeFigureOut">
               <a:rPr lang="ko-KR" altLang="en-US" smtClean="0"/>
-              <a:t>2020-06-02</a:t>
+              <a:t>2020-06-03</a:t>
             </a:fld>
             <a:endParaRPr lang="ko-KR" altLang="en-US"/>
           </a:p>
@@ -2670,7 +2670,7 @@
           <a:p>
             <a:fld id="{5E9156A5-F3EC-48FB-8574-275309479A4C}" type="datetimeFigureOut">
               <a:rPr lang="ko-KR" altLang="en-US" smtClean="0"/>
-              <a:t>2020-06-02</a:t>
+              <a:t>2020-06-03</a:t>
             </a:fld>
             <a:endParaRPr lang="ko-KR" altLang="en-US"/>
           </a:p>
@@ -2911,7 +2911,7 @@
           <a:p>
             <a:fld id="{5E9156A5-F3EC-48FB-8574-275309479A4C}" type="datetimeFigureOut">
               <a:rPr lang="ko-KR" altLang="en-US" smtClean="0"/>
-              <a:t>2020-06-02</a:t>
+              <a:t>2020-06-03</a:t>
             </a:fld>
             <a:endParaRPr lang="ko-KR" altLang="en-US"/>
           </a:p>
@@ -4847,14 +4847,14 @@
           <p:nvPr>
             <p:extLst>
               <p:ext uri="{D42A27DB-BD31-4B8C-83A1-F6EECF244321}">
-                <p14:modId xmlns:p14="http://schemas.microsoft.com/office/powerpoint/2010/main" val="430849166"/>
+                <p14:modId xmlns:p14="http://schemas.microsoft.com/office/powerpoint/2010/main" val="2192111807"/>
               </p:ext>
             </p:extLst>
           </p:nvPr>
         </p:nvGraphicFramePr>
         <p:xfrm>
           <a:off x="219403" y="2714092"/>
-          <a:ext cx="11884673" cy="2110705"/>
+          <a:ext cx="11884673" cy="2340836"/>
         </p:xfrm>
         <a:graphic>
           <a:graphicData uri="http://schemas.openxmlformats.org/drawingml/2006/table">
@@ -5521,6 +5521,70 @@
                   <a:txBody>
                     <a:bodyPr/>
                     <a:lstStyle/>
+                    <a:p>
+                      <a:pPr marL="285750" marR="0" lvl="0" indent="-285750" algn="l" defTabSz="914400" rtl="0" eaLnBrk="1" fontAlgn="auto" latinLnBrk="1" hangingPunct="1">
+                        <a:lnSpc>
+                          <a:spcPct val="100000"/>
+                        </a:lnSpc>
+                        <a:spcBef>
+                          <a:spcPts val="0"/>
+                        </a:spcBef>
+                        <a:spcAft>
+                          <a:spcPts val="0"/>
+                        </a:spcAft>
+                        <a:buClrTx/>
+                        <a:buSzTx/>
+                        <a:buFont typeface="Arial" panose="020B0604020202020204" pitchFamily="34" charset="0"/>
+                        <a:buChar char="•"/>
+                        <a:tabLst/>
+                        <a:defRPr/>
+                      </a:pPr>
+                      <a:r>
+                        <a:rPr lang="ko-KR" altLang="en-US" sz="1600" dirty="0">
+                          <a:solidFill>
+                            <a:schemeClr val="tx1"/>
+                          </a:solidFill>
+                        </a:rPr>
+                        <a:t>표지</a:t>
+                      </a:r>
+                      <a:r>
+                        <a:rPr lang="en-US" altLang="ko-KR" sz="1600" dirty="0">
+                          <a:solidFill>
+                            <a:schemeClr val="tx1"/>
+                          </a:solidFill>
+                        </a:rPr>
+                        <a:t>, </a:t>
+                      </a:r>
+                      <a:r>
+                        <a:rPr lang="ko-KR" altLang="en-US" sz="1600" dirty="0">
+                          <a:solidFill>
+                            <a:schemeClr val="tx1"/>
+                          </a:solidFill>
+                        </a:rPr>
+                        <a:t>문서 이력</a:t>
+                      </a:r>
+                      <a:r>
+                        <a:rPr lang="en-US" altLang="ko-KR" sz="1600" dirty="0">
+                          <a:solidFill>
+                            <a:schemeClr val="tx1"/>
+                          </a:solidFill>
+                        </a:rPr>
+                        <a:t> </a:t>
+                      </a:r>
+                      <a:r>
+                        <a:rPr lang="ko-KR" altLang="en-US" sz="1600" dirty="0">
+                          <a:solidFill>
+                            <a:schemeClr val="tx1"/>
+                          </a:solidFill>
+                        </a:rPr>
+                        <a:t>추가</a:t>
+                      </a:r>
+                      <a:endParaRPr lang="en-US" altLang="ko-KR" sz="1600" dirty="0">
+                        <a:solidFill>
+                          <a:schemeClr val="tx1"/>
+                        </a:solidFill>
+                      </a:endParaRPr>
+                    </a:p>
                     <a:p>
                       <a:pPr marL="285750" indent="-285750" algn="l" latinLnBrk="1">
                         <a:buFont typeface="Arial" panose="020B0604020202020204" pitchFamily="34" charset="0"/>

</xml_diff>